<commit_message>
improvements of the ui logic of show plot tweaks
</commit_message>
<xml_diff>
--- a/src/mzkit/man.pptx
+++ b/src/mzkit/man.pptx
@@ -118,7 +118,7 @@
   </p:defaultTextStyle>
   <p:extLst>
     <p:ext uri="{EFAFB233-063F-42B5-8137-9DF3F51BA10A}">
-      <p15:sldGuideLst xmlns:p15="http://schemas.microsoft.com/office/powerpoint/2012/main" xmlns="">
+      <p15:sldGuideLst xmlns="" xmlns:p15="http://schemas.microsoft.com/office/powerpoint/2012/main">
         <p15:guide id="1" orient="horz" pos="1800">
           <p15:clr>
             <a:srgbClr val="A4A3A4"/>
@@ -132,7 +132,7 @@
       </p15:sldGuideLst>
     </p:ext>
     <p:ext uri="{2D200454-40CA-4A62-9FC3-DE9A4176ACB9}">
-      <p15:notesGuideLst xmlns:p15="http://schemas.microsoft.com/office/powerpoint/2012/main" xmlns="">
+      <p15:notesGuideLst xmlns="" xmlns:p15="http://schemas.microsoft.com/office/powerpoint/2012/main">
         <p15:guide id="1" orient="horz" pos="2880">
           <p15:clr>
             <a:srgbClr val="A4A3A4"/>

</xml_diff>